<commit_message>
update genome assembly lecture
</commit_message>
<xml_diff>
--- a/Lectures/Lecture 5 - Genome Assembly.pptx
+++ b/Lectures/Lecture 5 - Genome Assembly.pptx
@@ -6807,7 +6807,7 @@
             </a:pPr>
             <a:r>
               <a:rPr lang="en-US" sz="2000" dirty="0"/>
-              <a:t>This combination is very effective for accurate genome assembly, except when both reads are in repeat regions</a:t>
+              <a:t>This combination is very effective for accurate genome assembly, except when both reads are in repeat regions:</a:t>
             </a:r>
           </a:p>
           <a:p>
@@ -7849,8 +7849,8 @@
         </p:nvSpPr>
         <p:spPr>
           <a:xfrm>
-            <a:off x="107504" y="1609636"/>
-            <a:ext cx="1512168" cy="523220"/>
+            <a:off x="85314" y="1549460"/>
+            <a:ext cx="1512168" cy="1384995"/>
           </a:xfrm>
           <a:prstGeom prst="rect">
             <a:avLst/>
@@ -7868,7 +7868,7 @@
           <a:p>
             <a:r>
               <a:rPr lang="en-US" sz="1400" dirty="0"/>
-              <a:t>PHRED trimming, error correction</a:t>
+              <a:t>PHRED trimming, error correction – only use high quality data in genomic pipelines!</a:t>
             </a:r>
           </a:p>
         </p:txBody>
@@ -11596,6 +11596,38 @@
               <a:rPr lang="en-US" sz="1400" dirty="0"/>
               <a:t>/zwng5cb</a:t>
             </a:r>
+          </a:p>
+        </p:txBody>
+      </p:sp>
+      <p:sp>
+        <p:nvSpPr>
+          <p:cNvPr id="2" name="TextBox 1">
+            <a:extLst>
+              <a:ext uri="{FF2B5EF4-FFF2-40B4-BE49-F238E27FC236}">
+                <a16:creationId xmlns:a16="http://schemas.microsoft.com/office/drawing/2014/main" id="{E0E35CB0-2763-0848-96A1-3B078110DCEE}"/>
+              </a:ext>
+            </a:extLst>
+          </p:cNvPr>
+          <p:cNvSpPr txBox="1"/>
+          <p:nvPr/>
+        </p:nvSpPr>
+        <p:spPr>
+          <a:xfrm>
+            <a:off x="10310648" y="5255172"/>
+            <a:ext cx="184731" cy="461665"/>
+          </a:xfrm>
+          <a:prstGeom prst="rect">
+            <a:avLst/>
+          </a:prstGeom>
+          <a:noFill/>
+        </p:spPr>
+        <p:txBody>
+          <a:bodyPr wrap="none" rtlCol="0">
+            <a:spAutoFit/>
+          </a:bodyPr>
+          <a:lstStyle/>
+          <a:p>
+            <a:endParaRPr lang="en-US" dirty="0"/>
           </a:p>
         </p:txBody>
       </p:sp>

</xml_diff>